<commit_message>
minor corrections to several slides
</commit_message>
<xml_diff>
--- a/PowerPoint/08 - Abstract Syntax Trees.pptx
+++ b/PowerPoint/08 - Abstract Syntax Trees.pptx
@@ -7097,22 +7097,19 @@
               <a:rPr lang="en-US" sz="1800" dirty="0">
                 <a:latin typeface="Consolas" pitchFamily="49" charset="0"/>
               </a:rPr>
-              <a:t>    public abstract void emit()</a:t>
-            </a:r>
-          </a:p>
-          <a:p>
-            <a:pPr marL="91440" indent="0">
-              <a:spcBef>
-                <a:spcPts val="100"/>
-              </a:spcBef>
-              <a:buFontTx/>
-              <a:buNone/>
-            </a:pPr>
-            <a:r>
-              <a:rPr lang="en-US" sz="1800" dirty="0">
+              <a:t>    public abstract void emit() throws </a:t>
+            </a:r>
+            <a:r>
+              <a:rPr lang="en-US" sz="1800" dirty="0" err="1">
                 <a:latin typeface="Consolas" pitchFamily="49" charset="0"/>
               </a:rPr>
-              <a:t>        throws CodeGenException, IOException;</a:t>
+              <a:t>CodeGenException</a:t>
+            </a:r>
+            <a:r>
+              <a:rPr lang="en-US" sz="1800" dirty="0">
+                <a:latin typeface="Consolas" pitchFamily="49" charset="0"/>
+              </a:rPr>
+              <a:t>;</a:t>
             </a:r>
           </a:p>
           <a:p>
@@ -7140,7 +7137,7 @@
         </p:nvSpPr>
         <p:spPr>
           <a:xfrm>
-            <a:off x="1185496" y="4895671"/>
+            <a:off x="1185496" y="4648200"/>
             <a:ext cx="6773008" cy="1200329"/>
           </a:xfrm>
           <a:prstGeom prst="rect">

</xml_diff>